<commit_message>
updates for kennedy usage
</commit_message>
<xml_diff>
--- a/powerpoint/1_ASSEMBLY_WORKSHOP.pptx
+++ b/powerpoint/1_ASSEMBLY_WORKSHOP.pptx
@@ -278,7 +278,7 @@
           <a:p>
             <a:fld id="{DEABCE53-1D99-4BEE-AE28-D2367C4FBEC7}" type="datetimeFigureOut">
               <a:rPr lang="en-GB" smtClean="0"/>
-              <a:t>08/10/2020</a:t>
+              <a:t>21/09/2022</a:t>
             </a:fld>
             <a:endParaRPr lang="en-GB"/>
           </a:p>
@@ -478,7 +478,7 @@
           <a:p>
             <a:fld id="{DEABCE53-1D99-4BEE-AE28-D2367C4FBEC7}" type="datetimeFigureOut">
               <a:rPr lang="en-GB" smtClean="0"/>
-              <a:t>08/10/2020</a:t>
+              <a:t>21/09/2022</a:t>
             </a:fld>
             <a:endParaRPr lang="en-GB"/>
           </a:p>
@@ -688,7 +688,7 @@
           <a:p>
             <a:fld id="{DEABCE53-1D99-4BEE-AE28-D2367C4FBEC7}" type="datetimeFigureOut">
               <a:rPr lang="en-GB" smtClean="0"/>
-              <a:t>08/10/2020</a:t>
+              <a:t>21/09/2022</a:t>
             </a:fld>
             <a:endParaRPr lang="en-GB"/>
           </a:p>
@@ -888,7 +888,7 @@
           <a:p>
             <a:fld id="{DEABCE53-1D99-4BEE-AE28-D2367C4FBEC7}" type="datetimeFigureOut">
               <a:rPr lang="en-GB" smtClean="0"/>
-              <a:t>08/10/2020</a:t>
+              <a:t>21/09/2022</a:t>
             </a:fld>
             <a:endParaRPr lang="en-GB"/>
           </a:p>
@@ -1164,7 +1164,7 @@
           <a:p>
             <a:fld id="{DEABCE53-1D99-4BEE-AE28-D2367C4FBEC7}" type="datetimeFigureOut">
               <a:rPr lang="en-GB" smtClean="0"/>
-              <a:t>08/10/2020</a:t>
+              <a:t>21/09/2022</a:t>
             </a:fld>
             <a:endParaRPr lang="en-GB"/>
           </a:p>
@@ -1432,7 +1432,7 @@
           <a:p>
             <a:fld id="{DEABCE53-1D99-4BEE-AE28-D2367C4FBEC7}" type="datetimeFigureOut">
               <a:rPr lang="en-GB" smtClean="0"/>
-              <a:t>08/10/2020</a:t>
+              <a:t>21/09/2022</a:t>
             </a:fld>
             <a:endParaRPr lang="en-GB"/>
           </a:p>
@@ -1847,7 +1847,7 @@
           <a:p>
             <a:fld id="{DEABCE53-1D99-4BEE-AE28-D2367C4FBEC7}" type="datetimeFigureOut">
               <a:rPr lang="en-GB" smtClean="0"/>
-              <a:t>08/10/2020</a:t>
+              <a:t>21/09/2022</a:t>
             </a:fld>
             <a:endParaRPr lang="en-GB"/>
           </a:p>
@@ -1989,7 +1989,7 @@
           <a:p>
             <a:fld id="{DEABCE53-1D99-4BEE-AE28-D2367C4FBEC7}" type="datetimeFigureOut">
               <a:rPr lang="en-GB" smtClean="0"/>
-              <a:t>08/10/2020</a:t>
+              <a:t>21/09/2022</a:t>
             </a:fld>
             <a:endParaRPr lang="en-GB"/>
           </a:p>
@@ -2102,7 +2102,7 @@
           <a:p>
             <a:fld id="{DEABCE53-1D99-4BEE-AE28-D2367C4FBEC7}" type="datetimeFigureOut">
               <a:rPr lang="en-GB" smtClean="0"/>
-              <a:t>08/10/2020</a:t>
+              <a:t>21/09/2022</a:t>
             </a:fld>
             <a:endParaRPr lang="en-GB"/>
           </a:p>
@@ -2415,7 +2415,7 @@
           <a:p>
             <a:fld id="{DEABCE53-1D99-4BEE-AE28-D2367C4FBEC7}" type="datetimeFigureOut">
               <a:rPr lang="en-GB" smtClean="0"/>
-              <a:t>08/10/2020</a:t>
+              <a:t>21/09/2022</a:t>
             </a:fld>
             <a:endParaRPr lang="en-GB"/>
           </a:p>
@@ -2704,7 +2704,7 @@
           <a:p>
             <a:fld id="{DEABCE53-1D99-4BEE-AE28-D2367C4FBEC7}" type="datetimeFigureOut">
               <a:rPr lang="en-GB" smtClean="0"/>
-              <a:t>08/10/2020</a:t>
+              <a:t>21/09/2022</a:t>
             </a:fld>
             <a:endParaRPr lang="en-GB"/>
           </a:p>
@@ -2947,7 +2947,7 @@
           <a:p>
             <a:fld id="{DEABCE53-1D99-4BEE-AE28-D2367C4FBEC7}" type="datetimeFigureOut">
               <a:rPr lang="en-GB" smtClean="0"/>
-              <a:t>08/10/2020</a:t>
+              <a:t>21/09/2022</a:t>
             </a:fld>
             <a:endParaRPr lang="en-GB"/>
           </a:p>
@@ -4689,12 +4689,84 @@
               <a:buNone/>
             </a:pPr>
             <a:r>
-              <a:rPr lang="en-GB" sz="2000" dirty="0">
+              <a:rPr lang="en-GB" sz="1100" dirty="0">
                 <a:solidFill>
                   <a:srgbClr val="FF0000"/>
                 </a:solidFill>
               </a:rPr>
-              <a:t>export PATH=/shelf/apps/ncbi-blast-2.7.1+/bin/:$PATH</a:t>
+              <a:t> </a:t>
+            </a:r>
+            <a:r>
+              <a:rPr lang="en-GB" sz="1400" dirty="0">
+                <a:solidFill>
+                  <a:srgbClr val="FF0000"/>
+                </a:solidFill>
+              </a:rPr>
+              <a:t>export PATH=/gpfs1/scratch/</a:t>
+            </a:r>
+            <a:r>
+              <a:rPr lang="en-GB" sz="1400" dirty="0" err="1">
+                <a:solidFill>
+                  <a:srgbClr val="FF0000"/>
+                </a:solidFill>
+              </a:rPr>
+              <a:t>bioinf</a:t>
+            </a:r>
+            <a:r>
+              <a:rPr lang="en-GB" sz="1400" dirty="0">
+                <a:solidFill>
+                  <a:srgbClr val="FF0000"/>
+                </a:solidFill>
+              </a:rPr>
+              <a:t>/BL4273/</a:t>
+            </a:r>
+            <a:r>
+              <a:rPr lang="en-GB" sz="1400" dirty="0" err="1">
+                <a:solidFill>
+                  <a:srgbClr val="FF0000"/>
+                </a:solidFill>
+              </a:rPr>
+              <a:t>conda</a:t>
+            </a:r>
+            <a:r>
+              <a:rPr lang="en-GB" sz="1400" dirty="0">
+                <a:solidFill>
+                  <a:srgbClr val="FF0000"/>
+                </a:solidFill>
+              </a:rPr>
+              <a:t>/</a:t>
+            </a:r>
+            <a:r>
+              <a:rPr lang="en-GB" sz="1400" dirty="0" err="1">
+                <a:solidFill>
+                  <a:srgbClr val="FF0000"/>
+                </a:solidFill>
+              </a:rPr>
+              <a:t>envs</a:t>
+            </a:r>
+            <a:r>
+              <a:rPr lang="en-GB" sz="1400" dirty="0">
+                <a:solidFill>
+                  <a:srgbClr val="FF0000"/>
+                </a:solidFill>
+              </a:rPr>
+              <a:t>/</a:t>
+            </a:r>
+            <a:r>
+              <a:rPr lang="en-GB" sz="1400" dirty="0" err="1">
+                <a:solidFill>
+                  <a:srgbClr val="FF0000"/>
+                </a:solidFill>
+              </a:rPr>
+              <a:t>genome_workshop</a:t>
+            </a:r>
+            <a:r>
+              <a:rPr lang="en-GB" sz="1400" dirty="0">
+                <a:solidFill>
+                  <a:srgbClr val="FF0000"/>
+                </a:solidFill>
+              </a:rPr>
+              <a:t>/bin/:$PATH</a:t>
             </a:r>
           </a:p>
           <a:p>
@@ -4702,17 +4774,14 @@
               <a:buNone/>
             </a:pPr>
             <a:r>
-              <a:rPr lang="en-GB" sz="2000" dirty="0"/>
-              <a:t># this is where the </a:t>
-            </a:r>
-            <a:r>
-              <a:rPr lang="en-GB" sz="2000" dirty="0" err="1"/>
-              <a:t>nr</a:t>
-            </a:r>
-            <a:r>
-              <a:rPr lang="en-GB" sz="2000" dirty="0"/>
-              <a:t>, </a:t>
-            </a:r>
+              <a:rPr lang="en-GB" sz="1100" dirty="0"/>
+              <a:t># this is where the nr, </a:t>
+            </a:r>
+          </a:p>
+          <a:p>
+            <a:pPr marL="0" indent="0">
+              <a:buNone/>
+            </a:pPr>
             <a:r>
               <a:rPr lang="en-GB" sz="2000" dirty="0" err="1"/>
               <a:t>nt</a:t>
@@ -4740,7 +4809,7 @@
                   <a:srgbClr val="FF0000"/>
                 </a:solidFill>
               </a:rPr>
-              <a:t>export BLASTDB=/shelf/public/</a:t>
+              <a:t>export BLASTDB/gpfs1/scratch/</a:t>
             </a:r>
             <a:r>
               <a:rPr lang="en-GB" sz="2000" dirty="0" err="1">
@@ -4748,7 +4817,7 @@
                   <a:srgbClr val="FF0000"/>
                 </a:solidFill>
               </a:rPr>
-              <a:t>blastntnr</a:t>
+              <a:t>bioinf</a:t>
             </a:r>
             <a:r>
               <a:rPr lang="en-GB" sz="2000" dirty="0">
@@ -4764,13 +4833,16 @@
                   <a:srgbClr val="FF0000"/>
                 </a:solidFill>
               </a:rPr>
-              <a:t>blastDatabases</a:t>
-            </a:r>
-            <a:endParaRPr lang="en-GB" sz="2000" dirty="0">
-              <a:solidFill>
-                <a:srgbClr val="FF0000"/>
-              </a:solidFill>
-            </a:endParaRPr>
+              <a:t>db</a:t>
+            </a:r>
+            <a:r>
+              <a:rPr lang="en-GB" sz="2000" dirty="0">
+                <a:solidFill>
+                  <a:srgbClr val="FF0000"/>
+                </a:solidFill>
+              </a:rPr>
+              <a:t>/databases/</a:t>
+            </a:r>
           </a:p>
           <a:p>
             <a:pPr marL="0" indent="0">
@@ -4816,7 +4888,7 @@
         </p:blipFill>
         <p:spPr>
           <a:xfrm>
-            <a:off x="6322774" y="1430031"/>
+            <a:off x="7074211" y="1430031"/>
             <a:ext cx="8294926" cy="5186669"/>
           </a:xfrm>
           <a:prstGeom prst="rect">
@@ -6248,7 +6320,15 @@
           <a:p>
             <a:r>
               <a:rPr lang="en-GB" dirty="0"/>
-              <a:t>Open this power point (you wont be able to yet!). Learn how to connect to Marvin (</a:t>
+              <a:t>Open this power point (you wont be able to yet!). Learn how to connect to Marvin or </a:t>
+            </a:r>
+            <a:r>
+              <a:rPr lang="en-GB" dirty="0" err="1"/>
+              <a:t>kennedy</a:t>
+            </a:r>
+            <a:r>
+              <a:rPr lang="en-GB" dirty="0"/>
+              <a:t> (</a:t>
             </a:r>
             <a:r>
               <a:rPr lang="en-GB" dirty="0">

</xml_diff>